<commit_message>
Add the base class "LoadBalanceMethod"
</commit_message>
<xml_diff>
--- a/期末報告.pptx
+++ b/期末報告.pptx
@@ -105,6 +105,11 @@
       </a:defRPr>
     </a:lvl9pPr>
   </p:defaultTextStyle>
+  <p:extLst>
+    <p:ext uri="{EFAFB233-063F-42B5-8137-9DF3F51BA10A}">
+      <p15:sldGuideLst xmlns:p15="http://schemas.microsoft.com/office/powerpoint/2012/main"/>
+    </p:ext>
+  </p:extLst>
 </p:presentation>
 </file>
 
@@ -239,7 +244,7 @@
           <a:p>
             <a:fld id="{B67AA20B-DC2F-4703-B762-84C4F84C5369}" type="datetimeFigureOut">
               <a:rPr lang="zh-TW" altLang="en-US" smtClean="0"/>
-              <a:t>2021/12/28</a:t>
+              <a:t>2021/12/29</a:t>
             </a:fld>
             <a:endParaRPr lang="zh-TW" altLang="en-US"/>
           </a:p>
@@ -409,7 +414,7 @@
           <a:p>
             <a:fld id="{B67AA20B-DC2F-4703-B762-84C4F84C5369}" type="datetimeFigureOut">
               <a:rPr lang="zh-TW" altLang="en-US" smtClean="0"/>
-              <a:t>2021/12/28</a:t>
+              <a:t>2021/12/29</a:t>
             </a:fld>
             <a:endParaRPr lang="zh-TW" altLang="en-US"/>
           </a:p>
@@ -589,7 +594,7 @@
           <a:p>
             <a:fld id="{B67AA20B-DC2F-4703-B762-84C4F84C5369}" type="datetimeFigureOut">
               <a:rPr lang="zh-TW" altLang="en-US" smtClean="0"/>
-              <a:t>2021/12/28</a:t>
+              <a:t>2021/12/29</a:t>
             </a:fld>
             <a:endParaRPr lang="zh-TW" altLang="en-US"/>
           </a:p>
@@ -759,7 +764,7 @@
           <a:p>
             <a:fld id="{B67AA20B-DC2F-4703-B762-84C4F84C5369}" type="datetimeFigureOut">
               <a:rPr lang="zh-TW" altLang="en-US" smtClean="0"/>
-              <a:t>2021/12/28</a:t>
+              <a:t>2021/12/29</a:t>
             </a:fld>
             <a:endParaRPr lang="zh-TW" altLang="en-US"/>
           </a:p>
@@ -1005,7 +1010,7 @@
           <a:p>
             <a:fld id="{B67AA20B-DC2F-4703-B762-84C4F84C5369}" type="datetimeFigureOut">
               <a:rPr lang="zh-TW" altLang="en-US" smtClean="0"/>
-              <a:t>2021/12/28</a:t>
+              <a:t>2021/12/29</a:t>
             </a:fld>
             <a:endParaRPr lang="zh-TW" altLang="en-US"/>
           </a:p>
@@ -1237,7 +1242,7 @@
           <a:p>
             <a:fld id="{B67AA20B-DC2F-4703-B762-84C4F84C5369}" type="datetimeFigureOut">
               <a:rPr lang="zh-TW" altLang="en-US" smtClean="0"/>
-              <a:t>2021/12/28</a:t>
+              <a:t>2021/12/29</a:t>
             </a:fld>
             <a:endParaRPr lang="zh-TW" altLang="en-US"/>
           </a:p>
@@ -1604,7 +1609,7 @@
           <a:p>
             <a:fld id="{B67AA20B-DC2F-4703-B762-84C4F84C5369}" type="datetimeFigureOut">
               <a:rPr lang="zh-TW" altLang="en-US" smtClean="0"/>
-              <a:t>2021/12/28</a:t>
+              <a:t>2021/12/29</a:t>
             </a:fld>
             <a:endParaRPr lang="zh-TW" altLang="en-US"/>
           </a:p>
@@ -1722,7 +1727,7 @@
           <a:p>
             <a:fld id="{B67AA20B-DC2F-4703-B762-84C4F84C5369}" type="datetimeFigureOut">
               <a:rPr lang="zh-TW" altLang="en-US" smtClean="0"/>
-              <a:t>2021/12/28</a:t>
+              <a:t>2021/12/29</a:t>
             </a:fld>
             <a:endParaRPr lang="zh-TW" altLang="en-US"/>
           </a:p>
@@ -1817,7 +1822,7 @@
           <a:p>
             <a:fld id="{B67AA20B-DC2F-4703-B762-84C4F84C5369}" type="datetimeFigureOut">
               <a:rPr lang="zh-TW" altLang="en-US" smtClean="0"/>
-              <a:t>2021/12/28</a:t>
+              <a:t>2021/12/29</a:t>
             </a:fld>
             <a:endParaRPr lang="zh-TW" altLang="en-US"/>
           </a:p>
@@ -2094,7 +2099,7 @@
           <a:p>
             <a:fld id="{B67AA20B-DC2F-4703-B762-84C4F84C5369}" type="datetimeFigureOut">
               <a:rPr lang="zh-TW" altLang="en-US" smtClean="0"/>
-              <a:t>2021/12/28</a:t>
+              <a:t>2021/12/29</a:t>
             </a:fld>
             <a:endParaRPr lang="zh-TW" altLang="en-US"/>
           </a:p>
@@ -2347,7 +2352,7 @@
           <a:p>
             <a:fld id="{B67AA20B-DC2F-4703-B762-84C4F84C5369}" type="datetimeFigureOut">
               <a:rPr lang="zh-TW" altLang="en-US" smtClean="0"/>
-              <a:t>2021/12/28</a:t>
+              <a:t>2021/12/29</a:t>
             </a:fld>
             <a:endParaRPr lang="zh-TW" altLang="en-US"/>
           </a:p>
@@ -2560,7 +2565,7 @@
           <a:p>
             <a:fld id="{B67AA20B-DC2F-4703-B762-84C4F84C5369}" type="datetimeFigureOut">
               <a:rPr lang="zh-TW" altLang="en-US" smtClean="0"/>
-              <a:t>2021/12/28</a:t>
+              <a:t>2021/12/29</a:t>
             </a:fld>
             <a:endParaRPr lang="zh-TW" altLang="en-US"/>
           </a:p>
@@ -3062,11 +3067,24 @@
             <p:ph type="title"/>
           </p:nvPr>
         </p:nvSpPr>
-        <p:spPr/>
-        <p:txBody>
-          <a:bodyPr/>
-          <a:lstStyle/>
-          <a:p>
+        <p:spPr>
+          <a:xfrm>
+            <a:off x="838200" y="373437"/>
+            <a:ext cx="10515600" cy="1325563"/>
+          </a:xfrm>
+        </p:spPr>
+        <p:txBody>
+          <a:bodyPr/>
+          <a:lstStyle/>
+          <a:p>
+            <a:r>
+              <a:rPr lang="en-US" altLang="zh-TW" dirty="0" smtClean="0"/>
+              <a:t>Add a new class – </a:t>
+            </a:r>
+            <a:r>
+              <a:rPr lang="en-US" altLang="zh-TW" dirty="0" err="1" smtClean="0"/>
+              <a:t>My_UE_List</a:t>
+            </a:r>
             <a:endParaRPr lang="zh-TW" altLang="en-US" dirty="0"/>
           </a:p>
         </p:txBody>
@@ -3086,7 +3104,7 @@
           <a:bodyPr/>
           <a:lstStyle/>
           <a:p>
-            <a:endParaRPr lang="zh-TW" altLang="en-US"/>
+            <a:endParaRPr lang="zh-TW" altLang="en-US" dirty="0"/>
           </a:p>
         </p:txBody>
       </p:sp>

</xml_diff>